<commit_message>
Oi eu sou o gugukk
</commit_message>
<xml_diff>
--- a/Curso de Introdução à linguagem Scala.pptx
+++ b/Curso de Introdução à linguagem Scala.pptx
@@ -109,6 +109,11 @@
       </a:defRPr>
     </a:lvl9pPr>
   </p:defaultTextStyle>
+  <p:extLst>
+    <p:ext uri="{EFAFB233-063F-42B5-8137-9DF3F51BA10A}">
+      <p15:sldGuideLst xmlns:p15="http://schemas.microsoft.com/office/powerpoint/2012/main"/>
+    </p:ext>
+  </p:extLst>
 </p:presentation>
 </file>
 
@@ -325,7 +330,7 @@
           <a:p>
             <a:fld id="{050F6DEB-2DF2-49A6-A845-919113FB86AE}" type="datetimeFigureOut">
               <a:rPr lang="pt-BR" smtClean="0"/>
-              <a:t>15/10/2015</a:t>
+              <a:t>30/10/2015</a:t>
             </a:fld>
             <a:endParaRPr lang="pt-BR"/>
           </a:p>
@@ -367,7 +372,7 @@
           <a:p>
             <a:fld id="{CA64F9DD-C15D-4E0C-822A-CD446CF999AE}" type="slidenum">
               <a:rPr lang="pt-BR" smtClean="0"/>
-              <a:t>‹#›</a:t>
+              <a:t>‹nº›</a:t>
             </a:fld>
             <a:endParaRPr lang="pt-BR"/>
           </a:p>
@@ -621,7 +626,7 @@
           <a:p>
             <a:fld id="{050F6DEB-2DF2-49A6-A845-919113FB86AE}" type="datetimeFigureOut">
               <a:rPr lang="pt-BR" smtClean="0"/>
-              <a:t>15/10/2015</a:t>
+              <a:t>30/10/2015</a:t>
             </a:fld>
             <a:endParaRPr lang="pt-BR"/>
           </a:p>
@@ -663,7 +668,7 @@
           <a:p>
             <a:fld id="{CA64F9DD-C15D-4E0C-822A-CD446CF999AE}" type="slidenum">
               <a:rPr lang="pt-BR" smtClean="0"/>
-              <a:t>‹#›</a:t>
+              <a:t>‹nº›</a:t>
             </a:fld>
             <a:endParaRPr lang="pt-BR"/>
           </a:p>
@@ -880,7 +885,7 @@
           <a:p>
             <a:fld id="{050F6DEB-2DF2-49A6-A845-919113FB86AE}" type="datetimeFigureOut">
               <a:rPr lang="pt-BR" smtClean="0"/>
-              <a:t>15/10/2015</a:t>
+              <a:t>30/10/2015</a:t>
             </a:fld>
             <a:endParaRPr lang="pt-BR"/>
           </a:p>
@@ -922,7 +927,7 @@
           <a:p>
             <a:fld id="{CA64F9DD-C15D-4E0C-822A-CD446CF999AE}" type="slidenum">
               <a:rPr lang="pt-BR" smtClean="0"/>
-              <a:t>‹#›</a:t>
+              <a:t>‹nº›</a:t>
             </a:fld>
             <a:endParaRPr lang="pt-BR"/>
           </a:p>
@@ -1349,7 +1354,7 @@
           <a:p>
             <a:fld id="{050F6DEB-2DF2-49A6-A845-919113FB86AE}" type="datetimeFigureOut">
               <a:rPr lang="pt-BR" smtClean="0"/>
-              <a:t>15/10/2015</a:t>
+              <a:t>30/10/2015</a:t>
             </a:fld>
             <a:endParaRPr lang="pt-BR"/>
           </a:p>
@@ -1391,7 +1396,7 @@
           <a:p>
             <a:fld id="{CA64F9DD-C15D-4E0C-822A-CD446CF999AE}" type="slidenum">
               <a:rPr lang="pt-BR" smtClean="0"/>
-              <a:t>‹#›</a:t>
+              <a:t>‹nº›</a:t>
             </a:fld>
             <a:endParaRPr lang="pt-BR"/>
           </a:p>
@@ -1529,7 +1534,7 @@
           <a:p>
             <a:fld id="{050F6DEB-2DF2-49A6-A845-919113FB86AE}" type="datetimeFigureOut">
               <a:rPr lang="pt-BR" smtClean="0"/>
-              <a:t>15/10/2015</a:t>
+              <a:t>30/10/2015</a:t>
             </a:fld>
             <a:endParaRPr lang="pt-BR"/>
           </a:p>
@@ -1571,7 +1576,7 @@
           <a:p>
             <a:fld id="{CA64F9DD-C15D-4E0C-822A-CD446CF999AE}" type="slidenum">
               <a:rPr lang="pt-BR" smtClean="0"/>
-              <a:t>‹#›</a:t>
+              <a:t>‹nº›</a:t>
             </a:fld>
             <a:endParaRPr lang="pt-BR"/>
           </a:p>
@@ -2105,7 +2110,7 @@
           <a:p>
             <a:fld id="{050F6DEB-2DF2-49A6-A845-919113FB86AE}" type="datetimeFigureOut">
               <a:rPr lang="pt-BR" smtClean="0"/>
-              <a:t>15/10/2015</a:t>
+              <a:t>30/10/2015</a:t>
             </a:fld>
             <a:endParaRPr lang="pt-BR"/>
           </a:p>
@@ -2147,7 +2152,7 @@
           <a:p>
             <a:fld id="{CA64F9DD-C15D-4E0C-822A-CD446CF999AE}" type="slidenum">
               <a:rPr lang="pt-BR" smtClean="0"/>
-              <a:t>‹#›</a:t>
+              <a:t>‹nº›</a:t>
             </a:fld>
             <a:endParaRPr lang="pt-BR"/>
           </a:p>
@@ -2437,7 +2442,7 @@
           <a:p>
             <a:fld id="{050F6DEB-2DF2-49A6-A845-919113FB86AE}" type="datetimeFigureOut">
               <a:rPr lang="pt-BR" smtClean="0"/>
-              <a:t>15/10/2015</a:t>
+              <a:t>30/10/2015</a:t>
             </a:fld>
             <a:endParaRPr lang="pt-BR"/>
           </a:p>
@@ -2479,7 +2484,7 @@
           <a:p>
             <a:fld id="{CA64F9DD-C15D-4E0C-822A-CD446CF999AE}" type="slidenum">
               <a:rPr lang="pt-BR" smtClean="0"/>
-              <a:t>‹#›</a:t>
+              <a:t>‹nº›</a:t>
             </a:fld>
             <a:endParaRPr lang="pt-BR"/>
           </a:p>
@@ -2612,7 +2617,7 @@
           <a:p>
             <a:fld id="{050F6DEB-2DF2-49A6-A845-919113FB86AE}" type="datetimeFigureOut">
               <a:rPr lang="pt-BR" smtClean="0"/>
-              <a:t>15/10/2015</a:t>
+              <a:t>30/10/2015</a:t>
             </a:fld>
             <a:endParaRPr lang="pt-BR"/>
           </a:p>
@@ -2654,7 +2659,7 @@
           <a:p>
             <a:fld id="{CA64F9DD-C15D-4E0C-822A-CD446CF999AE}" type="slidenum">
               <a:rPr lang="pt-BR" smtClean="0"/>
-              <a:t>‹#›</a:t>
+              <a:t>‹nº›</a:t>
             </a:fld>
             <a:endParaRPr lang="pt-BR"/>
           </a:p>
@@ -2792,7 +2797,7 @@
           <a:p>
             <a:fld id="{050F6DEB-2DF2-49A6-A845-919113FB86AE}" type="datetimeFigureOut">
               <a:rPr lang="pt-BR" smtClean="0"/>
-              <a:t>15/10/2015</a:t>
+              <a:t>30/10/2015</a:t>
             </a:fld>
             <a:endParaRPr lang="pt-BR"/>
           </a:p>
@@ -2834,7 +2839,7 @@
           <a:p>
             <a:fld id="{CA64F9DD-C15D-4E0C-822A-CD446CF999AE}" type="slidenum">
               <a:rPr lang="pt-BR" smtClean="0"/>
-              <a:t>‹#›</a:t>
+              <a:t>‹nº›</a:t>
             </a:fld>
             <a:endParaRPr lang="pt-BR"/>
           </a:p>
@@ -2967,7 +2972,7 @@
           <a:p>
             <a:fld id="{050F6DEB-2DF2-49A6-A845-919113FB86AE}" type="datetimeFigureOut">
               <a:rPr lang="pt-BR" smtClean="0"/>
-              <a:t>15/10/2015</a:t>
+              <a:t>30/10/2015</a:t>
             </a:fld>
             <a:endParaRPr lang="pt-BR"/>
           </a:p>
@@ -3009,7 +3014,7 @@
           <a:p>
             <a:fld id="{CA64F9DD-C15D-4E0C-822A-CD446CF999AE}" type="slidenum">
               <a:rPr lang="pt-BR" smtClean="0"/>
-              <a:t>‹#›</a:t>
+              <a:t>‹nº›</a:t>
             </a:fld>
             <a:endParaRPr lang="pt-BR"/>
           </a:p>
@@ -3224,7 +3229,7 @@
           <a:p>
             <a:fld id="{050F6DEB-2DF2-49A6-A845-919113FB86AE}" type="datetimeFigureOut">
               <a:rPr lang="pt-BR" smtClean="0"/>
-              <a:t>15/10/2015</a:t>
+              <a:t>30/10/2015</a:t>
             </a:fld>
             <a:endParaRPr lang="pt-BR"/>
           </a:p>
@@ -3266,7 +3271,7 @@
           <a:p>
             <a:fld id="{CA64F9DD-C15D-4E0C-822A-CD446CF999AE}" type="slidenum">
               <a:rPr lang="pt-BR" smtClean="0"/>
-              <a:t>‹#›</a:t>
+              <a:t>‹nº›</a:t>
             </a:fld>
             <a:endParaRPr lang="pt-BR"/>
           </a:p>
@@ -3521,7 +3526,7 @@
           <a:p>
             <a:fld id="{050F6DEB-2DF2-49A6-A845-919113FB86AE}" type="datetimeFigureOut">
               <a:rPr lang="pt-BR" smtClean="0"/>
-              <a:t>15/10/2015</a:t>
+              <a:t>30/10/2015</a:t>
             </a:fld>
             <a:endParaRPr lang="pt-BR"/>
           </a:p>
@@ -3563,7 +3568,7 @@
           <a:p>
             <a:fld id="{CA64F9DD-C15D-4E0C-822A-CD446CF999AE}" type="slidenum">
               <a:rPr lang="pt-BR" smtClean="0"/>
-              <a:t>‹#›</a:t>
+              <a:t>‹nº›</a:t>
             </a:fld>
             <a:endParaRPr lang="pt-BR"/>
           </a:p>
@@ -3951,7 +3956,7 @@
           <a:p>
             <a:fld id="{050F6DEB-2DF2-49A6-A845-919113FB86AE}" type="datetimeFigureOut">
               <a:rPr lang="pt-BR" smtClean="0"/>
-              <a:t>15/10/2015</a:t>
+              <a:t>30/10/2015</a:t>
             </a:fld>
             <a:endParaRPr lang="pt-BR"/>
           </a:p>
@@ -3993,7 +3998,7 @@
           <a:p>
             <a:fld id="{CA64F9DD-C15D-4E0C-822A-CD446CF999AE}" type="slidenum">
               <a:rPr lang="pt-BR" smtClean="0"/>
-              <a:t>‹#›</a:t>
+              <a:t>‹nº›</a:t>
             </a:fld>
             <a:endParaRPr lang="pt-BR"/>
           </a:p>
@@ -4069,7 +4074,7 @@
           <a:p>
             <a:fld id="{050F6DEB-2DF2-49A6-A845-919113FB86AE}" type="datetimeFigureOut">
               <a:rPr lang="pt-BR" smtClean="0"/>
-              <a:t>15/10/2015</a:t>
+              <a:t>30/10/2015</a:t>
             </a:fld>
             <a:endParaRPr lang="pt-BR"/>
           </a:p>
@@ -4111,7 +4116,7 @@
           <a:p>
             <a:fld id="{CA64F9DD-C15D-4E0C-822A-CD446CF999AE}" type="slidenum">
               <a:rPr lang="pt-BR" smtClean="0"/>
-              <a:t>‹#›</a:t>
+              <a:t>‹nº›</a:t>
             </a:fld>
             <a:endParaRPr lang="pt-BR"/>
           </a:p>
@@ -4164,7 +4169,7 @@
           <a:p>
             <a:fld id="{050F6DEB-2DF2-49A6-A845-919113FB86AE}" type="datetimeFigureOut">
               <a:rPr lang="pt-BR" smtClean="0"/>
-              <a:t>15/10/2015</a:t>
+              <a:t>30/10/2015</a:t>
             </a:fld>
             <a:endParaRPr lang="pt-BR"/>
           </a:p>
@@ -4206,7 +4211,7 @@
           <a:p>
             <a:fld id="{CA64F9DD-C15D-4E0C-822A-CD446CF999AE}" type="slidenum">
               <a:rPr lang="pt-BR" smtClean="0"/>
-              <a:t>‹#›</a:t>
+              <a:t>‹nº›</a:t>
             </a:fld>
             <a:endParaRPr lang="pt-BR"/>
           </a:p>
@@ -4447,7 +4452,7 @@
           <a:p>
             <a:fld id="{050F6DEB-2DF2-49A6-A845-919113FB86AE}" type="datetimeFigureOut">
               <a:rPr lang="pt-BR" smtClean="0"/>
-              <a:t>15/10/2015</a:t>
+              <a:t>30/10/2015</a:t>
             </a:fld>
             <a:endParaRPr lang="pt-BR"/>
           </a:p>
@@ -4489,7 +4494,7 @@
           <a:p>
             <a:fld id="{CA64F9DD-C15D-4E0C-822A-CD446CF999AE}" type="slidenum">
               <a:rPr lang="pt-BR" smtClean="0"/>
-              <a:t>‹#›</a:t>
+              <a:t>‹nº›</a:t>
             </a:fld>
             <a:endParaRPr lang="pt-BR"/>
           </a:p>
@@ -4738,7 +4743,7 @@
           <a:p>
             <a:fld id="{050F6DEB-2DF2-49A6-A845-919113FB86AE}" type="datetimeFigureOut">
               <a:rPr lang="pt-BR" smtClean="0"/>
-              <a:t>15/10/2015</a:t>
+              <a:t>30/10/2015</a:t>
             </a:fld>
             <a:endParaRPr lang="pt-BR"/>
           </a:p>
@@ -4790,7 +4795,7 @@
           <a:p>
             <a:fld id="{CA64F9DD-C15D-4E0C-822A-CD446CF999AE}" type="slidenum">
               <a:rPr lang="pt-BR" smtClean="0"/>
-              <a:t>‹#›</a:t>
+              <a:t>‹nº›</a:t>
             </a:fld>
             <a:endParaRPr lang="pt-BR"/>
           </a:p>
@@ -4969,7 +4974,7 @@
           <a:p>
             <a:fld id="{050F6DEB-2DF2-49A6-A845-919113FB86AE}" type="datetimeFigureOut">
               <a:rPr lang="pt-BR" smtClean="0"/>
-              <a:t>15/10/2015</a:t>
+              <a:t>30/10/2015</a:t>
             </a:fld>
             <a:endParaRPr lang="pt-BR"/>
           </a:p>
@@ -5063,7 +5068,7 @@
           <a:p>
             <a:fld id="{CA64F9DD-C15D-4E0C-822A-CD446CF999AE}" type="slidenum">
               <a:rPr lang="pt-BR" smtClean="0"/>
-              <a:t>‹#›</a:t>
+              <a:t>‹nº›</a:t>
             </a:fld>
             <a:endParaRPr lang="pt-BR"/>
           </a:p>
@@ -5789,6 +5794,36 @@
           </a:p>
         </p:txBody>
       </p:sp>
+      <p:pic>
+        <p:nvPicPr>
+          <p:cNvPr id="4" name="Imagem 3"/>
+          <p:cNvPicPr>
+            <a:picLocks noChangeAspect="1"/>
+          </p:cNvPicPr>
+          <p:nvPr/>
+        </p:nvPicPr>
+        <p:blipFill>
+          <a:blip r:embed="rId2">
+            <a:extLst>
+              <a:ext uri="{28A0092B-C50C-407E-A947-70E740481C1C}">
+                <a14:useLocalDpi xmlns:a14="http://schemas.microsoft.com/office/drawing/2010/main" val="0"/>
+              </a:ext>
+            </a:extLst>
+          </a:blip>
+          <a:stretch>
+            <a:fillRect/>
+          </a:stretch>
+        </p:blipFill>
+        <p:spPr>
+          <a:xfrm>
+            <a:off x="3810000" y="1143000"/>
+            <a:ext cx="4572000" cy="4572000"/>
+          </a:xfrm>
+          <a:prstGeom prst="rect">
+            <a:avLst/>
+          </a:prstGeom>
+        </p:spPr>
+      </p:pic>
     </p:spTree>
     <p:extLst>
       <p:ext uri="{BB962C8B-B14F-4D97-AF65-F5344CB8AC3E}">

</xml_diff>